<commit_message>
update wording on Powerpoint
</commit_message>
<xml_diff>
--- a/Powerpoint.pptx
+++ b/Powerpoint.pptx
@@ -204,7 +204,7 @@
           <a:p>
             <a:fld id="{A5C20BB3-3CCB-4FE5-991B-82F6BCB48AF3}" type="datetimeFigureOut">
               <a:rPr lang="en-US" smtClean="0"/>
-              <a:t>10/23/2023</a:t>
+              <a:t>10/24/2023</a:t>
             </a:fld>
             <a:endParaRPr lang="en-US"/>
           </a:p>
@@ -946,7 +946,7 @@
             <a:fld id="{3C633830-2244-49AE-BC4A-47F415C177C6}" type="datetimeFigureOut">
               <a:rPr lang="en-US" dirty="0"/>
               <a:pPr/>
-              <a:t>10/23/2023</a:t>
+              <a:t>10/24/2023</a:t>
             </a:fld>
             <a:endParaRPr lang="en-US" dirty="0"/>
           </a:p>
@@ -1194,7 +1194,7 @@
           <a:p>
             <a:fld id="{3C633830-2244-49AE-BC4A-47F415C177C6}" type="datetimeFigureOut">
               <a:rPr lang="en-US" dirty="0"/>
-              <a:t>10/23/2023</a:t>
+              <a:t>10/24/2023</a:t>
             </a:fld>
             <a:endParaRPr lang="en-US" dirty="0"/>
           </a:p>
@@ -1580,7 +1580,7 @@
           <a:p>
             <a:fld id="{3C633830-2244-49AE-BC4A-47F415C177C6}" type="datetimeFigureOut">
               <a:rPr lang="en-US" dirty="0"/>
-              <a:t>10/23/2023</a:t>
+              <a:t>10/24/2023</a:t>
             </a:fld>
             <a:endParaRPr lang="en-US" dirty="0"/>
           </a:p>
@@ -1809,7 +1809,7 @@
           <a:p>
             <a:fld id="{3C633830-2244-49AE-BC4A-47F415C177C6}" type="datetimeFigureOut">
               <a:rPr lang="en-US" dirty="0"/>
-              <a:t>10/23/2023</a:t>
+              <a:t>10/24/2023</a:t>
             </a:fld>
             <a:endParaRPr lang="en-US" dirty="0"/>
           </a:p>
@@ -2301,7 +2301,7 @@
             <a:fld id="{3C633830-2244-49AE-BC4A-47F415C177C6}" type="datetimeFigureOut">
               <a:rPr lang="en-US" dirty="0"/>
               <a:pPr/>
-              <a:t>10/23/2023</a:t>
+              <a:t>10/24/2023</a:t>
             </a:fld>
             <a:endParaRPr lang="en-US" dirty="0"/>
           </a:p>
@@ -2612,7 +2612,7 @@
           <a:p>
             <a:fld id="{3C633830-2244-49AE-BC4A-47F415C177C6}" type="datetimeFigureOut">
               <a:rPr lang="en-US" dirty="0"/>
-              <a:t>10/23/2023</a:t>
+              <a:t>10/24/2023</a:t>
             </a:fld>
             <a:endParaRPr lang="en-US" dirty="0"/>
           </a:p>
@@ -3003,7 +3003,7 @@
           <a:p>
             <a:fld id="{3C633830-2244-49AE-BC4A-47F415C177C6}" type="datetimeFigureOut">
               <a:rPr lang="en-US" dirty="0"/>
-              <a:t>10/23/2023</a:t>
+              <a:t>10/24/2023</a:t>
             </a:fld>
             <a:endParaRPr lang="en-US" dirty="0"/>
           </a:p>
@@ -3121,7 +3121,7 @@
           <a:p>
             <a:fld id="{3C633830-2244-49AE-BC4A-47F415C177C6}" type="datetimeFigureOut">
               <a:rPr lang="en-US" dirty="0"/>
-              <a:t>10/23/2023</a:t>
+              <a:t>10/24/2023</a:t>
             </a:fld>
             <a:endParaRPr lang="en-US" dirty="0"/>
           </a:p>
@@ -3216,7 +3216,7 @@
           <a:p>
             <a:fld id="{3C633830-2244-49AE-BC4A-47F415C177C6}" type="datetimeFigureOut">
               <a:rPr lang="en-US" dirty="0"/>
-              <a:t>10/23/2023</a:t>
+              <a:t>10/24/2023</a:t>
             </a:fld>
             <a:endParaRPr lang="en-US" dirty="0"/>
           </a:p>
@@ -3516,7 +3516,7 @@
           <a:p>
             <a:fld id="{3C633830-2244-49AE-BC4A-47F415C177C6}" type="datetimeFigureOut">
               <a:rPr lang="en-US" dirty="0"/>
-              <a:t>10/23/2023</a:t>
+              <a:t>10/24/2023</a:t>
             </a:fld>
             <a:endParaRPr lang="en-US" dirty="0"/>
           </a:p>
@@ -3781,7 +3781,7 @@
           <a:p>
             <a:fld id="{3C633830-2244-49AE-BC4A-47F415C177C6}" type="datetimeFigureOut">
               <a:rPr lang="en-US" dirty="0"/>
-              <a:t>10/23/2023</a:t>
+              <a:t>10/24/2023</a:t>
             </a:fld>
             <a:endParaRPr lang="en-US" dirty="0"/>
           </a:p>
@@ -4200,7 +4200,7 @@
             <a:fld id="{3C633830-2244-49AE-BC4A-47F415C177C6}" type="datetimeFigureOut">
               <a:rPr lang="en-US" dirty="0"/>
               <a:pPr/>
-              <a:t>10/23/2023</a:t>
+              <a:t>10/24/2023</a:t>
             </a:fld>
             <a:endParaRPr lang="en-US" dirty="0"/>
           </a:p>
@@ -6157,7 +6157,19 @@
               <a:rPr lang="en-US" sz="3200" dirty="0">
                 <a:latin typeface="Arial" panose="020B0604020202020204" pitchFamily="34" charset="0"/>
               </a:rPr>
-              <a:t>By creating a tool powered by a Python Flask API and includes HTML/CSS, JavaScript, and a Postgres database, the user can analyze the national data of school </a:t>
+              <a:t>By creating a tool powered by a Python Flask API, HTML/CSS, JavaScript, and a Postgres database, the user can </a:t>
+            </a:r>
+            <a:r>
+              <a:rPr lang="en-US" sz="3200">
+                <a:latin typeface="Arial" panose="020B0604020202020204" pitchFamily="34" charset="0"/>
+              </a:rPr>
+              <a:t>analyze the data </a:t>
+            </a:r>
+            <a:r>
+              <a:rPr lang="en-US" sz="3200" dirty="0">
+                <a:latin typeface="Arial" panose="020B0604020202020204" pitchFamily="34" charset="0"/>
+              </a:rPr>
+              <a:t>of school </a:t>
             </a:r>
             <a:r>
               <a:rPr lang="en-US" sz="3200" b="0" i="0" dirty="0">

</xml_diff>